<commit_message>
Binary Relationship Change - See PowerPoint
</commit_message>
<xml_diff>
--- a/Phase I/ER Model.pptx
+++ b/Phase I/ER Model.pptx
@@ -121,7 +121,7 @@
 <file path=ppt/revisionInfo.xml><?xml version="1.0" encoding="utf-8"?>
 <p1510:revInfo xmlns:a="http://schemas.openxmlformats.org/drawingml/2006/main" xmlns:r="http://schemas.openxmlformats.org/officeDocument/2006/relationships" xmlns:p1510="http://schemas.microsoft.com/office/powerpoint/2015/10/main">
   <p1510:revLst>
-    <p1510:client id="{4A7DDA94-6371-42D1-B025-C351617463C0}" v="30" dt="2022-11-10T20:45:32.993"/>
+    <p1510:client id="{4A7DDA94-6371-42D1-B025-C351617463C0}" v="34" dt="2022-11-15T20:48:27.670"/>
   </p1510:revLst>
 </p1510:revInfo>
 </file>
@@ -208,12 +208,12 @@
   <pc:docChgLst>
     <pc:chgData name="Clark Necciai" userId="2d3c143e28508c56" providerId="LiveId" clId="{4A7DDA94-6371-42D1-B025-C351617463C0}"/>
     <pc:docChg chg="undo redo custSel addSld delSld modSld">
-      <pc:chgData name="Clark Necciai" userId="2d3c143e28508c56" providerId="LiveId" clId="{4A7DDA94-6371-42D1-B025-C351617463C0}" dt="2022-11-10T20:46:12.133" v="417" actId="1076"/>
+      <pc:chgData name="Clark Necciai" userId="2d3c143e28508c56" providerId="LiveId" clId="{4A7DDA94-6371-42D1-B025-C351617463C0}" dt="2022-11-15T20:48:49.650" v="462" actId="1076"/>
       <pc:docMkLst>
         <pc:docMk/>
       </pc:docMkLst>
       <pc:sldChg chg="addSp delSp modSp mod">
-        <pc:chgData name="Clark Necciai" userId="2d3c143e28508c56" providerId="LiveId" clId="{4A7DDA94-6371-42D1-B025-C351617463C0}" dt="2022-11-10T20:46:12.133" v="417" actId="1076"/>
+        <pc:chgData name="Clark Necciai" userId="2d3c143e28508c56" providerId="LiveId" clId="{4A7DDA94-6371-42D1-B025-C351617463C0}" dt="2022-11-15T20:48:49.650" v="462" actId="1076"/>
         <pc:sldMkLst>
           <pc:docMk/>
           <pc:sldMk cId="3265300168" sldId="257"/>
@@ -235,7 +235,15 @@
           </ac:spMkLst>
         </pc:spChg>
         <pc:spChg chg="mod">
-          <ac:chgData name="Clark Necciai" userId="2d3c143e28508c56" providerId="LiveId" clId="{4A7DDA94-6371-42D1-B025-C351617463C0}" dt="2022-11-10T20:46:01.696" v="412" actId="1076"/>
+          <ac:chgData name="Clark Necciai" userId="2d3c143e28508c56" providerId="LiveId" clId="{4A7DDA94-6371-42D1-B025-C351617463C0}" dt="2022-11-15T20:48:45.965" v="461" actId="1076"/>
+          <ac:spMkLst>
+            <pc:docMk/>
+            <pc:sldMk cId="3265300168" sldId="257"/>
+            <ac:spMk id="4" creationId="{4A1C037F-862B-DB0E-9BFB-63FF9E935B69}"/>
+          </ac:spMkLst>
+        </pc:spChg>
+        <pc:spChg chg="mod">
+          <ac:chgData name="Clark Necciai" userId="2d3c143e28508c56" providerId="LiveId" clId="{4A7DDA94-6371-42D1-B025-C351617463C0}" dt="2022-11-15T20:46:37.385" v="440" actId="1076"/>
           <ac:spMkLst>
             <pc:docMk/>
             <pc:sldMk cId="3265300168" sldId="257"/>
@@ -267,6 +275,14 @@
           </ac:spMkLst>
         </pc:spChg>
         <pc:spChg chg="add mod">
+          <ac:chgData name="Clark Necciai" userId="2d3c143e28508c56" providerId="LiveId" clId="{4A7DDA94-6371-42D1-B025-C351617463C0}" dt="2022-11-15T20:48:49.650" v="462" actId="1076"/>
+          <ac:spMkLst>
+            <pc:docMk/>
+            <pc:sldMk cId="3265300168" sldId="257"/>
+            <ac:spMk id="26" creationId="{A3212B53-C4ED-22A7-E047-947996D6F31B}"/>
+          </ac:spMkLst>
+        </pc:spChg>
+        <pc:spChg chg="add mod">
           <ac:chgData name="Clark Necciai" userId="2d3c143e28508c56" providerId="LiveId" clId="{4A7DDA94-6371-42D1-B025-C351617463C0}" dt="2022-11-10T15:31:57.378" v="160" actId="1076"/>
           <ac:spMkLst>
             <pc:docMk/>
@@ -290,12 +306,28 @@
             <ac:spMk id="38" creationId="{2A35CB83-1396-AF14-5659-2B120F6AB726}"/>
           </ac:spMkLst>
         </pc:spChg>
+        <pc:spChg chg="add mod">
+          <ac:chgData name="Clark Necciai" userId="2d3c143e28508c56" providerId="LiveId" clId="{4A7DDA94-6371-42D1-B025-C351617463C0}" dt="2022-11-15T20:48:33.287" v="459" actId="1076"/>
+          <ac:spMkLst>
+            <pc:docMk/>
+            <pc:sldMk cId="3265300168" sldId="257"/>
+            <ac:spMk id="59" creationId="{F42B7CD0-D1AD-F100-F90E-9F565A784941}"/>
+          </ac:spMkLst>
+        </pc:spChg>
         <pc:spChg chg="mod">
-          <ac:chgData name="Clark Necciai" userId="2d3c143e28508c56" providerId="LiveId" clId="{4A7DDA94-6371-42D1-B025-C351617463C0}" dt="2022-11-10T20:46:12.133" v="417" actId="1076"/>
+          <ac:chgData name="Clark Necciai" userId="2d3c143e28508c56" providerId="LiveId" clId="{4A7DDA94-6371-42D1-B025-C351617463C0}" dt="2022-11-15T20:45:37.026" v="418" actId="1076"/>
           <ac:spMkLst>
             <pc:docMk/>
             <pc:sldMk cId="3265300168" sldId="257"/>
             <ac:spMk id="194" creationId="{09685404-D215-D3A0-FA4E-3F2AA108597D}"/>
+          </ac:spMkLst>
+        </pc:spChg>
+        <pc:spChg chg="mod">
+          <ac:chgData name="Clark Necciai" userId="2d3c143e28508c56" providerId="LiveId" clId="{4A7DDA94-6371-42D1-B025-C351617463C0}" dt="2022-11-15T20:48:21.576" v="455" actId="1076"/>
+          <ac:spMkLst>
+            <pc:docMk/>
+            <pc:sldMk cId="3265300168" sldId="257"/>
+            <ac:spMk id="234" creationId="{66D19437-939F-5A79-99D5-F72C4DEC4C95}"/>
           </ac:spMkLst>
         </pc:spChg>
         <pc:grpChg chg="add del mod">
@@ -315,7 +347,7 @@
           </ac:grpSpMkLst>
         </pc:grpChg>
         <pc:grpChg chg="mod">
-          <ac:chgData name="Clark Necciai" userId="2d3c143e28508c56" providerId="LiveId" clId="{4A7DDA94-6371-42D1-B025-C351617463C0}" dt="2022-11-10T20:46:08.718" v="416" actId="1076"/>
+          <ac:chgData name="Clark Necciai" userId="2d3c143e28508c56" providerId="LiveId" clId="{4A7DDA94-6371-42D1-B025-C351617463C0}" dt="2022-11-15T20:45:46.359" v="423" actId="1076"/>
           <ac:grpSpMkLst>
             <pc:docMk/>
             <pc:sldMk cId="3265300168" sldId="257"/>
@@ -338,6 +370,22 @@
             <ac:cxnSpMk id="17" creationId="{2908FEA3-3F65-7118-477F-FCEC86E40A39}"/>
           </ac:cxnSpMkLst>
         </pc:cxnChg>
+        <pc:cxnChg chg="mod">
+          <ac:chgData name="Clark Necciai" userId="2d3c143e28508c56" providerId="LiveId" clId="{4A7DDA94-6371-42D1-B025-C351617463C0}" dt="2022-11-15T20:48:45.965" v="461" actId="1076"/>
+          <ac:cxnSpMkLst>
+            <pc:docMk/>
+            <pc:sldMk cId="3265300168" sldId="257"/>
+            <ac:cxnSpMk id="18" creationId="{96707A57-E3A1-652D-76B9-9CC1C91A65A1}"/>
+          </ac:cxnSpMkLst>
+        </pc:cxnChg>
+        <pc:cxnChg chg="add mod">
+          <ac:chgData name="Clark Necciai" userId="2d3c143e28508c56" providerId="LiveId" clId="{4A7DDA94-6371-42D1-B025-C351617463C0}" dt="2022-11-15T20:48:49.650" v="462" actId="1076"/>
+          <ac:cxnSpMkLst>
+            <pc:docMk/>
+            <pc:sldMk cId="3265300168" sldId="257"/>
+            <ac:cxnSpMk id="21" creationId="{CB8EDF73-4625-2318-98A1-F5350A9ADC30}"/>
+          </ac:cxnSpMkLst>
+        </pc:cxnChg>
         <pc:cxnChg chg="add mod">
           <ac:chgData name="Clark Necciai" userId="2d3c143e28508c56" providerId="LiveId" clId="{4A7DDA94-6371-42D1-B025-C351617463C0}" dt="2022-11-10T15:31:55.186" v="159" actId="1076"/>
           <ac:cxnSpMkLst>
@@ -346,8 +394,16 @@
             <ac:cxnSpMk id="22" creationId="{15333F18-1238-FD55-1ED2-22F290DDD873}"/>
           </ac:cxnSpMkLst>
         </pc:cxnChg>
+        <pc:cxnChg chg="del mod">
+          <ac:chgData name="Clark Necciai" userId="2d3c143e28508c56" providerId="LiveId" clId="{4A7DDA94-6371-42D1-B025-C351617463C0}" dt="2022-11-15T20:48:17.990" v="454" actId="478"/>
+          <ac:cxnSpMkLst>
+            <pc:docMk/>
+            <pc:sldMk cId="3265300168" sldId="257"/>
+            <ac:cxnSpMk id="28" creationId="{2A6FC7FD-49B4-CA70-4548-E644A0AE6D58}"/>
+          </ac:cxnSpMkLst>
+        </pc:cxnChg>
         <pc:cxnChg chg="mod">
-          <ac:chgData name="Clark Necciai" userId="2d3c143e28508c56" providerId="LiveId" clId="{4A7DDA94-6371-42D1-B025-C351617463C0}" dt="2022-11-10T20:46:01.696" v="412" actId="1076"/>
+          <ac:chgData name="Clark Necciai" userId="2d3c143e28508c56" providerId="LiveId" clId="{4A7DDA94-6371-42D1-B025-C351617463C0}" dt="2022-11-15T20:46:37.385" v="440" actId="1076"/>
           <ac:cxnSpMkLst>
             <pc:docMk/>
             <pc:sldMk cId="3265300168" sldId="257"/>
@@ -362,8 +418,16 @@
             <ac:cxnSpMk id="31" creationId="{8071CAE8-4D15-C46C-B8FE-2EEA5AF62A13}"/>
           </ac:cxnSpMkLst>
         </pc:cxnChg>
+        <pc:cxnChg chg="add mod">
+          <ac:chgData name="Clark Necciai" userId="2d3c143e28508c56" providerId="LiveId" clId="{4A7DDA94-6371-42D1-B025-C351617463C0}" dt="2022-11-15T20:48:49.650" v="462" actId="1076"/>
+          <ac:cxnSpMkLst>
+            <pc:docMk/>
+            <pc:sldMk cId="3265300168" sldId="257"/>
+            <ac:cxnSpMk id="35" creationId="{64603A7F-42B6-A491-3EE0-BB440D66FBA9}"/>
+          </ac:cxnSpMkLst>
+        </pc:cxnChg>
         <pc:cxnChg chg="mod">
-          <ac:chgData name="Clark Necciai" userId="2d3c143e28508c56" providerId="LiveId" clId="{4A7DDA94-6371-42D1-B025-C351617463C0}" dt="2022-11-10T20:46:12.133" v="417" actId="1076"/>
+          <ac:chgData name="Clark Necciai" userId="2d3c143e28508c56" providerId="LiveId" clId="{4A7DDA94-6371-42D1-B025-C351617463C0}" dt="2022-11-15T20:48:45.965" v="461" actId="1076"/>
           <ac:cxnSpMkLst>
             <pc:docMk/>
             <pc:sldMk cId="3265300168" sldId="257"/>
@@ -371,7 +435,7 @@
           </ac:cxnSpMkLst>
         </pc:cxnChg>
         <pc:cxnChg chg="mod">
-          <ac:chgData name="Clark Necciai" userId="2d3c143e28508c56" providerId="LiveId" clId="{4A7DDA94-6371-42D1-B025-C351617463C0}" dt="2022-11-10T20:46:08.718" v="416" actId="1076"/>
+          <ac:chgData name="Clark Necciai" userId="2d3c143e28508c56" providerId="LiveId" clId="{4A7DDA94-6371-42D1-B025-C351617463C0}" dt="2022-11-15T20:48:45.965" v="461" actId="1076"/>
           <ac:cxnSpMkLst>
             <pc:docMk/>
             <pc:sldMk cId="3265300168" sldId="257"/>
@@ -4422,7 +4486,7 @@
           <a:p>
             <a:fld id="{E0981F5B-2BEF-4D8E-8064-E6D20D34FC04}" type="datetimeFigureOut">
               <a:rPr lang="en-US" smtClean="0"/>
-              <a:t>11/10/2022</a:t>
+              <a:t>11/15/2022</a:t>
             </a:fld>
             <a:endParaRPr lang="en-US"/>
           </a:p>
@@ -4630,7 +4694,7 @@
           <a:p>
             <a:fld id="{E0981F5B-2BEF-4D8E-8064-E6D20D34FC04}" type="datetimeFigureOut">
               <a:rPr lang="en-US" smtClean="0"/>
-              <a:t>11/10/2022</a:t>
+              <a:t>11/15/2022</a:t>
             </a:fld>
             <a:endParaRPr lang="en-US"/>
           </a:p>
@@ -4886,7 +4950,7 @@
           <a:p>
             <a:fld id="{E0981F5B-2BEF-4D8E-8064-E6D20D34FC04}" type="datetimeFigureOut">
               <a:rPr lang="en-US" smtClean="0"/>
-              <a:t>11/10/2022</a:t>
+              <a:t>11/15/2022</a:t>
             </a:fld>
             <a:endParaRPr lang="en-US"/>
           </a:p>
@@ -5060,7 +5124,7 @@
           <a:p>
             <a:fld id="{E0981F5B-2BEF-4D8E-8064-E6D20D34FC04}" type="datetimeFigureOut">
               <a:rPr lang="en-US" smtClean="0"/>
-              <a:t>11/10/2022</a:t>
+              <a:t>11/15/2022</a:t>
             </a:fld>
             <a:endParaRPr lang="en-US"/>
           </a:p>
@@ -5403,7 +5467,7 @@
           <a:p>
             <a:fld id="{E0981F5B-2BEF-4D8E-8064-E6D20D34FC04}" type="datetimeFigureOut">
               <a:rPr lang="en-US" smtClean="0"/>
-              <a:t>11/10/2022</a:t>
+              <a:t>11/15/2022</a:t>
             </a:fld>
             <a:endParaRPr lang="en-US"/>
           </a:p>
@@ -5678,7 +5742,7 @@
           <a:p>
             <a:fld id="{E0981F5B-2BEF-4D8E-8064-E6D20D34FC04}" type="datetimeFigureOut">
               <a:rPr lang="en-US" smtClean="0"/>
-              <a:t>11/10/2022</a:t>
+              <a:t>11/15/2022</a:t>
             </a:fld>
             <a:endParaRPr lang="en-US"/>
           </a:p>
@@ -6057,7 +6121,7 @@
           <a:p>
             <a:fld id="{E0981F5B-2BEF-4D8E-8064-E6D20D34FC04}" type="datetimeFigureOut">
               <a:rPr lang="en-US" smtClean="0"/>
-              <a:t>11/10/2022</a:t>
+              <a:t>11/15/2022</a:t>
             </a:fld>
             <a:endParaRPr lang="en-US"/>
           </a:p>
@@ -6175,7 +6239,7 @@
           <a:p>
             <a:fld id="{E0981F5B-2BEF-4D8E-8064-E6D20D34FC04}" type="datetimeFigureOut">
               <a:rPr lang="en-US" smtClean="0"/>
-              <a:t>11/10/2022</a:t>
+              <a:t>11/15/2022</a:t>
             </a:fld>
             <a:endParaRPr lang="en-US"/>
           </a:p>
@@ -6346,7 +6410,7 @@
           <a:p>
             <a:fld id="{E0981F5B-2BEF-4D8E-8064-E6D20D34FC04}" type="datetimeFigureOut">
               <a:rPr lang="en-US" smtClean="0"/>
-              <a:t>11/10/2022</a:t>
+              <a:t>11/15/2022</a:t>
             </a:fld>
             <a:endParaRPr lang="en-US"/>
           </a:p>
@@ -6700,7 +6764,7 @@
           <a:p>
             <a:fld id="{E0981F5B-2BEF-4D8E-8064-E6D20D34FC04}" type="datetimeFigureOut">
               <a:rPr lang="en-US" smtClean="0"/>
-              <a:t>11/10/2022</a:t>
+              <a:t>11/15/2022</a:t>
             </a:fld>
             <a:endParaRPr lang="en-US"/>
           </a:p>
@@ -7082,7 +7146,7 @@
           <a:p>
             <a:fld id="{E0981F5B-2BEF-4D8E-8064-E6D20D34FC04}" type="datetimeFigureOut">
               <a:rPr lang="en-US" smtClean="0"/>
-              <a:t>11/10/2022</a:t>
+              <a:t>11/15/2022</a:t>
             </a:fld>
             <a:endParaRPr lang="en-US"/>
           </a:p>
@@ -7369,7 +7433,7 @@
           <a:p>
             <a:fld id="{E0981F5B-2BEF-4D8E-8064-E6D20D34FC04}" type="datetimeFigureOut">
               <a:rPr lang="en-US" smtClean="0"/>
-              <a:t>11/10/2022</a:t>
+              <a:t>11/15/2022</a:t>
             </a:fld>
             <a:endParaRPr lang="en-US"/>
           </a:p>
@@ -8056,7 +8120,7 @@
         </p:nvSpPr>
         <p:spPr>
           <a:xfrm>
-            <a:off x="5975674" y="2624376"/>
+            <a:off x="5867110" y="2624856"/>
             <a:ext cx="1863791" cy="830424"/>
           </a:xfrm>
           <a:prstGeom prst="rect">
@@ -8489,53 +8553,8 @@
         </p:nvCxnSpPr>
         <p:spPr>
           <a:xfrm flipH="1">
-            <a:off x="5092914" y="3039588"/>
-            <a:ext cx="882760" cy="12187"/>
-          </a:xfrm>
-          <a:prstGeom prst="line">
-            <a:avLst/>
-          </a:prstGeom>
-          <a:ln w="38100">
-            <a:solidFill>
-              <a:schemeClr val="tx1"/>
-            </a:solidFill>
-          </a:ln>
-        </p:spPr>
-        <p:style>
-          <a:lnRef idx="1">
-            <a:schemeClr val="dk1"/>
-          </a:lnRef>
-          <a:fillRef idx="0">
-            <a:schemeClr val="dk1"/>
-          </a:fillRef>
-          <a:effectRef idx="0">
-            <a:schemeClr val="dk1"/>
-          </a:effectRef>
-          <a:fontRef idx="minor">
-            <a:schemeClr val="tx1"/>
-          </a:fontRef>
-        </p:style>
-      </p:cxnSp>
-      <p:cxnSp>
-        <p:nvCxnSpPr>
-          <p:cNvPr id="28" name="Straight Connector 27">
-            <a:extLst>
-              <a:ext uri="{FF2B5EF4-FFF2-40B4-BE49-F238E27FC236}">
-                <a16:creationId xmlns:a16="http://schemas.microsoft.com/office/drawing/2014/main" id="{2A6FC7FD-49B4-CA70-4548-E644A0AE6D58}"/>
-              </a:ext>
-            </a:extLst>
-          </p:cNvPr>
-          <p:cNvCxnSpPr>
-            <a:cxnSpLocks/>
-            <a:stCxn id="4" idx="0"/>
-            <a:endCxn id="27" idx="2"/>
-          </p:cNvCxnSpPr>
-          <p:nvPr/>
-        </p:nvCxnSpPr>
-        <p:spPr>
-          <a:xfrm flipH="1" flipV="1">
-            <a:off x="6891074" y="1549363"/>
-            <a:ext cx="16496" cy="1075013"/>
+            <a:off x="5092914" y="3040068"/>
+            <a:ext cx="774196" cy="11707"/>
           </a:xfrm>
           <a:prstGeom prst="line">
             <a:avLst/>
@@ -9022,7 +9041,7 @@
         </p:nvSpPr>
         <p:spPr>
           <a:xfrm>
-            <a:off x="9004319" y="1624589"/>
+            <a:off x="9914004" y="2168329"/>
             <a:ext cx="2198946" cy="555227"/>
           </a:xfrm>
           <a:prstGeom prst="ellipse">
@@ -9277,15 +9296,15 @@
           </p:cNvPr>
           <p:cNvCxnSpPr>
             <a:cxnSpLocks/>
-            <a:stCxn id="5" idx="2"/>
-            <a:endCxn id="9" idx="0"/>
+            <a:stCxn id="5" idx="3"/>
+            <a:endCxn id="9" idx="7"/>
           </p:cNvCxnSpPr>
           <p:nvPr/>
         </p:nvCxnSpPr>
         <p:spPr>
-          <a:xfrm>
-            <a:off x="10103792" y="1333457"/>
-            <a:ext cx="0" cy="291132"/>
+          <a:xfrm flipH="1">
+            <a:off x="11790922" y="819108"/>
+            <a:ext cx="6797" cy="1430532"/>
           </a:xfrm>
           <a:prstGeom prst="line">
             <a:avLst/>
@@ -9329,8 +9348,8 @@
         </p:nvCxnSpPr>
         <p:spPr>
           <a:xfrm flipH="1">
-            <a:off x="6891074" y="3454800"/>
-            <a:ext cx="16496" cy="244589"/>
+            <a:off x="6142978" y="3455280"/>
+            <a:ext cx="656028" cy="290103"/>
           </a:xfrm>
           <a:prstGeom prst="line">
             <a:avLst/>
@@ -9367,15 +9386,15 @@
           </p:cNvPr>
           <p:cNvCxnSpPr>
             <a:cxnSpLocks/>
-            <a:stCxn id="4" idx="3"/>
-            <a:endCxn id="196" idx="2"/>
+            <a:stCxn id="4" idx="2"/>
+            <a:endCxn id="196" idx="1"/>
           </p:cNvCxnSpPr>
           <p:nvPr/>
         </p:nvCxnSpPr>
         <p:spPr>
           <a:xfrm>
-            <a:off x="7839465" y="3039588"/>
-            <a:ext cx="676960" cy="0"/>
+            <a:off x="6799006" y="3455280"/>
+            <a:ext cx="687781" cy="307740"/>
           </a:xfrm>
           <a:prstGeom prst="line">
             <a:avLst/>
@@ -9698,7 +9717,7 @@
         </p:nvSpPr>
         <p:spPr>
           <a:xfrm>
-            <a:off x="6126482" y="3699389"/>
+            <a:off x="5378386" y="3745383"/>
             <a:ext cx="1529183" cy="507903"/>
           </a:xfrm>
           <a:prstGeom prst="ellipse">
@@ -9754,7 +9773,7 @@
         </p:nvGrpSpPr>
         <p:grpSpPr>
           <a:xfrm>
-            <a:off x="8516425" y="2785636"/>
+            <a:off x="7254322" y="3688639"/>
             <a:ext cx="1587367" cy="507903"/>
             <a:chOff x="9543722" y="5803912"/>
             <a:chExt cx="1474713" cy="468634"/>
@@ -9902,7 +9921,7 @@
         </p:nvSpPr>
         <p:spPr>
           <a:xfrm>
-            <a:off x="6989272" y="1902203"/>
+            <a:off x="7938138" y="2399343"/>
             <a:ext cx="336952" cy="369332"/>
           </a:xfrm>
           <a:prstGeom prst="rect">
@@ -10295,6 +10314,188 @@
           </a:fontRef>
         </p:style>
       </p:cxnSp>
+      <p:cxnSp>
+        <p:nvCxnSpPr>
+          <p:cNvPr id="21" name="Straight Connector 20">
+            <a:extLst>
+              <a:ext uri="{FF2B5EF4-FFF2-40B4-BE49-F238E27FC236}">
+                <a16:creationId xmlns:a16="http://schemas.microsoft.com/office/drawing/2014/main" id="{CB8EDF73-4625-2318-98A1-F5350A9ADC30}"/>
+              </a:ext>
+            </a:extLst>
+          </p:cNvPr>
+          <p:cNvCxnSpPr>
+            <a:cxnSpLocks/>
+            <a:stCxn id="4" idx="3"/>
+            <a:endCxn id="26" idx="1"/>
+          </p:cNvCxnSpPr>
+          <p:nvPr/>
+        </p:nvCxnSpPr>
+        <p:spPr>
+          <a:xfrm flipV="1">
+            <a:off x="7730901" y="2646022"/>
+            <a:ext cx="603782" cy="394046"/>
+          </a:xfrm>
+          <a:prstGeom prst="line">
+            <a:avLst/>
+          </a:prstGeom>
+          <a:ln w="38100">
+            <a:solidFill>
+              <a:schemeClr val="tx1"/>
+            </a:solidFill>
+          </a:ln>
+        </p:spPr>
+        <p:style>
+          <a:lnRef idx="1">
+            <a:schemeClr val="dk1"/>
+          </a:lnRef>
+          <a:fillRef idx="0">
+            <a:schemeClr val="dk1"/>
+          </a:fillRef>
+          <a:effectRef idx="0">
+            <a:schemeClr val="dk1"/>
+          </a:effectRef>
+          <a:fontRef idx="minor">
+            <a:schemeClr val="tx1"/>
+          </a:fontRef>
+        </p:style>
+      </p:cxnSp>
+      <p:sp>
+        <p:nvSpPr>
+          <p:cNvPr id="26" name="Diamond 25">
+            <a:extLst>
+              <a:ext uri="{FF2B5EF4-FFF2-40B4-BE49-F238E27FC236}">
+                <a16:creationId xmlns:a16="http://schemas.microsoft.com/office/drawing/2014/main" id="{A3212B53-C4ED-22A7-E047-947996D6F31B}"/>
+              </a:ext>
+            </a:extLst>
+          </p:cNvPr>
+          <p:cNvSpPr/>
+          <p:nvPr/>
+        </p:nvSpPr>
+        <p:spPr>
+          <a:xfrm>
+            <a:off x="8334683" y="1913569"/>
+            <a:ext cx="1590148" cy="1464906"/>
+          </a:xfrm>
+          <a:prstGeom prst="diamond">
+            <a:avLst/>
+          </a:prstGeom>
+          <a:solidFill>
+            <a:schemeClr val="accent2"/>
+          </a:solidFill>
+          <a:ln w="38100">
+            <a:solidFill>
+              <a:schemeClr val="tx1"/>
+            </a:solidFill>
+          </a:ln>
+        </p:spPr>
+        <p:style>
+          <a:lnRef idx="2">
+            <a:schemeClr val="accent1">
+              <a:shade val="50000"/>
+            </a:schemeClr>
+          </a:lnRef>
+          <a:fillRef idx="1">
+            <a:schemeClr val="accent1"/>
+          </a:fillRef>
+          <a:effectRef idx="0">
+            <a:schemeClr val="accent1"/>
+          </a:effectRef>
+          <a:fontRef idx="minor">
+            <a:schemeClr val="lt1"/>
+          </a:fontRef>
+        </p:style>
+        <p:txBody>
+          <a:bodyPr rtlCol="0" anchor="ctr"/>
+          <a:lstStyle/>
+          <a:p>
+            <a:pPr algn="ctr"/>
+            <a:r>
+              <a:rPr lang="en-US" sz="1000" dirty="0"/>
+              <a:t>Carries</a:t>
+            </a:r>
+          </a:p>
+        </p:txBody>
+      </p:sp>
+      <p:cxnSp>
+        <p:nvCxnSpPr>
+          <p:cNvPr id="35" name="Straight Connector 34">
+            <a:extLst>
+              <a:ext uri="{FF2B5EF4-FFF2-40B4-BE49-F238E27FC236}">
+                <a16:creationId xmlns:a16="http://schemas.microsoft.com/office/drawing/2014/main" id="{64603A7F-42B6-A491-3EE0-BB440D66FBA9}"/>
+              </a:ext>
+            </a:extLst>
+          </p:cNvPr>
+          <p:cNvCxnSpPr>
+            <a:cxnSpLocks/>
+            <a:stCxn id="26" idx="0"/>
+            <a:endCxn id="5" idx="2"/>
+          </p:cNvCxnSpPr>
+          <p:nvPr/>
+        </p:nvCxnSpPr>
+        <p:spPr>
+          <a:xfrm flipV="1">
+            <a:off x="9129757" y="1333457"/>
+            <a:ext cx="974035" cy="580112"/>
+          </a:xfrm>
+          <a:prstGeom prst="line">
+            <a:avLst/>
+          </a:prstGeom>
+          <a:ln w="38100" cmpd="dbl">
+            <a:solidFill>
+              <a:schemeClr val="tx1"/>
+            </a:solidFill>
+          </a:ln>
+        </p:spPr>
+        <p:style>
+          <a:lnRef idx="1">
+            <a:schemeClr val="dk1"/>
+          </a:lnRef>
+          <a:fillRef idx="0">
+            <a:schemeClr val="dk1"/>
+          </a:fillRef>
+          <a:effectRef idx="0">
+            <a:schemeClr val="dk1"/>
+          </a:effectRef>
+          <a:fontRef idx="minor">
+            <a:schemeClr val="tx1"/>
+          </a:fontRef>
+        </p:style>
+      </p:cxnSp>
+      <p:sp>
+        <p:nvSpPr>
+          <p:cNvPr id="59" name="TextBox 58">
+            <a:extLst>
+              <a:ext uri="{FF2B5EF4-FFF2-40B4-BE49-F238E27FC236}">
+                <a16:creationId xmlns:a16="http://schemas.microsoft.com/office/drawing/2014/main" id="{F42B7CD0-D1AD-F100-F90E-9F565A784941}"/>
+              </a:ext>
+            </a:extLst>
+          </p:cNvPr>
+          <p:cNvSpPr txBox="1"/>
+          <p:nvPr/>
+        </p:nvSpPr>
+        <p:spPr>
+          <a:xfrm>
+            <a:off x="9031281" y="1502951"/>
+            <a:ext cx="292068" cy="369332"/>
+          </a:xfrm>
+          <a:prstGeom prst="rect">
+            <a:avLst/>
+          </a:prstGeom>
+          <a:noFill/>
+        </p:spPr>
+        <p:txBody>
+          <a:bodyPr wrap="none" rtlCol="0">
+            <a:spAutoFit/>
+          </a:bodyPr>
+          <a:lstStyle/>
+          <a:p>
+            <a:r>
+              <a:rPr lang="en-US" dirty="0"/>
+              <a:t>Z</a:t>
+            </a:r>
+          </a:p>
+        </p:txBody>
+      </p:sp>
     </p:spTree>
     <p:extLst>
       <p:ext uri="{BB962C8B-B14F-4D97-AF65-F5344CB8AC3E}">

</xml_diff>